<commit_message>
Visione e correzione della documentazione IA
</commit_message>
<xml_diff>
--- a/modulo/Modulo di IA.pptx
+++ b/modulo/Modulo di IA.pptx
@@ -124,6 +124,11 @@
       </a:defRPr>
     </a:lvl9pPr>
   </p:defaultTextStyle>
+  <p:extLst>
+    <p:ext uri="{EFAFB233-063F-42B5-8137-9DF3F51BA10A}">
+      <p15:sldGuideLst xmlns:p15="http://schemas.microsoft.com/office/powerpoint/2012/main"/>
+    </p:ext>
+  </p:extLst>
 </p:presentation>
 </file>
 
@@ -7106,17 +7111,13 @@
                 <a:ea typeface="Calibri" panose="020F0502020204030204" pitchFamily="34" charset="0"/>
                 <a:cs typeface="Times New Roman" panose="02020603050405020304" pitchFamily="18" charset="0"/>
               </a:rPr>
-              <a:t>=0, </a:t>
-            </a:r>
-            <a:r>
-              <a:rPr lang="it-IT" sz="1800" dirty="0" err="1">
-                <a:effectLst/>
-                <a:latin typeface="Calibri" panose="020F0502020204030204" pitchFamily="34" charset="0"/>
-                <a:ea typeface="Calibri" panose="020F0502020204030204" pitchFamily="34" charset="0"/>
-                <a:cs typeface="Times New Roman" panose="02020603050405020304" pitchFamily="18" charset="0"/>
-              </a:rPr>
-              <a:t>sottinsiemi</a:t>
-            </a:r>
+              <a:t>=0, sottoinsiemi di variabili casuali</a:t>
+            </a:r>
+          </a:p>
+          <a:p>
+            <a:pPr marL="0" indent="0">
+              <a:buNone/>
+            </a:pPr>
             <a:r>
               <a:rPr lang="it-IT" sz="1800" dirty="0">
                 <a:effectLst/>
@@ -7124,7 +7125,25 @@
                 <a:ea typeface="Calibri" panose="020F0502020204030204" pitchFamily="34" charset="0"/>
                 <a:cs typeface="Times New Roman" panose="02020603050405020304" pitchFamily="18" charset="0"/>
               </a:rPr>
-              <a:t> di variabili casuali</a:t>
+              <a:t>Lasciamo il default per altri parametri come per esempio il criterio=</a:t>
+            </a:r>
+            <a:r>
+              <a:rPr lang="it-IT" sz="1800" i="1" dirty="0" err="1">
+                <a:effectLst/>
+                <a:latin typeface="Calibri" panose="020F0502020204030204" pitchFamily="34" charset="0"/>
+                <a:ea typeface="Calibri" panose="020F0502020204030204" pitchFamily="34" charset="0"/>
+                <a:cs typeface="Times New Roman" panose="02020603050405020304" pitchFamily="18" charset="0"/>
+              </a:rPr>
+              <a:t>gini</a:t>
+            </a:r>
+            <a:r>
+              <a:rPr lang="it-IT" sz="1800" dirty="0">
+                <a:effectLst/>
+                <a:latin typeface="Calibri" panose="020F0502020204030204" pitchFamily="34" charset="0"/>
+                <a:ea typeface="Calibri" panose="020F0502020204030204" pitchFamily="34" charset="0"/>
+                <a:cs typeface="Times New Roman" panose="02020603050405020304" pitchFamily="18" charset="0"/>
+              </a:rPr>
+              <a:t>, la funzione per misurare la qualità di uno split di un nodo dell’albero</a:t>
             </a:r>
           </a:p>
           <a:p>
@@ -7132,38 +7151,6 @@
               <a:buNone/>
             </a:pPr>
             <a:r>
-              <a:rPr lang="it-IT" sz="1800" dirty="0">
-                <a:effectLst/>
-                <a:latin typeface="Calibri" panose="020F0502020204030204" pitchFamily="34" charset="0"/>
-                <a:ea typeface="Calibri" panose="020F0502020204030204" pitchFamily="34" charset="0"/>
-                <a:cs typeface="Times New Roman" panose="02020603050405020304" pitchFamily="18" charset="0"/>
-              </a:rPr>
-              <a:t>Lasciamo il default per altri parametri come per esempio il criterio=</a:t>
-            </a:r>
-            <a:r>
-              <a:rPr lang="it-IT" sz="1800" i="1" dirty="0" err="1">
-                <a:effectLst/>
-                <a:latin typeface="Calibri" panose="020F0502020204030204" pitchFamily="34" charset="0"/>
-                <a:ea typeface="Calibri" panose="020F0502020204030204" pitchFamily="34" charset="0"/>
-                <a:cs typeface="Times New Roman" panose="02020603050405020304" pitchFamily="18" charset="0"/>
-              </a:rPr>
-              <a:t>gini</a:t>
-            </a:r>
-            <a:r>
-              <a:rPr lang="it-IT" sz="1800" dirty="0">
-                <a:effectLst/>
-                <a:latin typeface="Calibri" panose="020F0502020204030204" pitchFamily="34" charset="0"/>
-                <a:ea typeface="Calibri" panose="020F0502020204030204" pitchFamily="34" charset="0"/>
-                <a:cs typeface="Times New Roman" panose="02020603050405020304" pitchFamily="18" charset="0"/>
-              </a:rPr>
-              <a:t>, la funzione per misurare la qualità di uno split di un nodo dell’albero</a:t>
-            </a:r>
-          </a:p>
-          <a:p>
-            <a:pPr marL="0" indent="0">
-              <a:buNone/>
-            </a:pPr>
-            <a:r>
               <a:rPr lang="it-IT" dirty="0">
                 <a:latin typeface="Calibri" panose="020F0502020204030204" pitchFamily="34" charset="0"/>
                 <a:cs typeface="Times New Roman" panose="02020603050405020304" pitchFamily="18" charset="0"/>
@@ -7182,7 +7169,7 @@
                 <a:latin typeface="Calibri" panose="020F0502020204030204" pitchFamily="34" charset="0"/>
                 <a:cs typeface="Times New Roman" panose="02020603050405020304" pitchFamily="18" charset="0"/>
               </a:rPr>
-              <a:t> andiamo ad addestrare sul training set</a:t>
+              <a:t>() andiamo ad addestrare sul training set</a:t>
             </a:r>
             <a:endParaRPr lang="it-IT" dirty="0"/>
           </a:p>
@@ -8105,6 +8092,15 @@
               <a:t>predict</a:t>
             </a:r>
             <a:r>
+              <a:rPr lang="it-IT" sz="1800" i="1" dirty="0">
+                <a:effectLst/>
+                <a:latin typeface="Calibri" panose="020F0502020204030204" pitchFamily="34" charset="0"/>
+                <a:ea typeface="Calibri" panose="020F0502020204030204" pitchFamily="34" charset="0"/>
+                <a:cs typeface="Times New Roman" panose="02020603050405020304" pitchFamily="18" charset="0"/>
+              </a:rPr>
+              <a:t>()</a:t>
+            </a:r>
+            <a:r>
               <a:rPr lang="it-IT" sz="1800" dirty="0">
                 <a:effectLst/>
                 <a:latin typeface="Calibri" panose="020F0502020204030204" pitchFamily="34" charset="0"/>
@@ -8140,6 +8136,15 @@
                 <a:cs typeface="Times New Roman" panose="02020603050405020304" pitchFamily="18" charset="0"/>
               </a:rPr>
               <a:t>predict</a:t>
+            </a:r>
+            <a:r>
+              <a:rPr lang="it-IT" sz="1800" i="1" dirty="0">
+                <a:effectLst/>
+                <a:latin typeface="Calibri" panose="020F0502020204030204" pitchFamily="34" charset="0"/>
+                <a:ea typeface="Calibri" panose="020F0502020204030204" pitchFamily="34" charset="0"/>
+                <a:cs typeface="Times New Roman" panose="02020603050405020304" pitchFamily="18" charset="0"/>
+              </a:rPr>
+              <a:t>()</a:t>
             </a:r>
             <a:r>
               <a:rPr lang="it-IT" sz="1800" dirty="0">
@@ -8859,7 +8864,7 @@
         </p:blipFill>
         <p:spPr>
           <a:xfrm>
-            <a:off x="5547348" y="4099731"/>
+            <a:off x="4905722" y="4072463"/>
             <a:ext cx="2915044" cy="1631696"/>
           </a:xfrm>
           <a:prstGeom prst="rect">
@@ -9974,7 +9979,7 @@
             </a:pPr>
             <a:r>
               <a:rPr lang="it-IT" dirty="0"/>
-              <a:t>Tutto il software è raggiungibile al link: https://github.com/Ciro-Fusco/NewDM , modulo link: https://github.com/Ciro-Fusco/NewDM/tree/Codice/modulo</a:t>
+              <a:t>Tutto il software è raggiungibile al link: https://github.com/Ciro-Fusco/NewDM , il modulo al link: https://github.com/Ciro-Fusco/NewDM/tree/Codice/modulo</a:t>
             </a:r>
           </a:p>
         </p:txBody>
@@ -10373,6 +10378,18 @@
                 <a:cs typeface="Times New Roman" panose="02020603050405020304" pitchFamily="18" charset="0"/>
               </a:rPr>
               <a:t> </a:t>
+            </a:r>
+            <a:r>
+              <a:rPr lang="it-IT" sz="1800" dirty="0">
+                <a:solidFill>
+                  <a:srgbClr val="FF0000"/>
+                </a:solidFill>
+                <a:effectLst/>
+                <a:latin typeface="Calibri" panose="020F0502020204030204" pitchFamily="34" charset="0"/>
+                <a:ea typeface="Calibri" panose="020F0502020204030204" pitchFamily="34" charset="0"/>
+                <a:cs typeface="Times New Roman" panose="02020603050405020304" pitchFamily="18" charset="0"/>
+              </a:rPr>
+              <a:t>.</a:t>
             </a:r>
             <a:r>
               <a:rPr lang="it-IT" sz="1800" i="1" dirty="0" err="1">

</xml_diff>

<commit_message>
Modifiche TP e TCS, aggiunta link modulo FIA
</commit_message>
<xml_diff>
--- a/modulo/Modulo di IA.pptx
+++ b/modulo/Modulo di IA.pptx
@@ -8621,6 +8621,36 @@
           </a:p>
         </p:txBody>
       </p:sp>
+      <p:pic>
+        <p:nvPicPr>
+          <p:cNvPr id="5" name="Immagine 4" descr="Immagine che contiene testo, screenshot, elettronico&#10;&#10;Descrizione generata automaticamente">
+            <a:extLst>
+              <a:ext uri="{FF2B5EF4-FFF2-40B4-BE49-F238E27FC236}">
+                <a16:creationId xmlns:a16="http://schemas.microsoft.com/office/drawing/2014/main" id="{2B570445-4872-4612-8936-4F1D81987718}"/>
+              </a:ext>
+            </a:extLst>
+          </p:cNvPr>
+          <p:cNvPicPr>
+            <a:picLocks noChangeAspect="1"/>
+          </p:cNvPicPr>
+          <p:nvPr/>
+        </p:nvPicPr>
+        <p:blipFill>
+          <a:blip r:embed="rId2"/>
+          <a:stretch>
+            <a:fillRect/>
+          </a:stretch>
+        </p:blipFill>
+        <p:spPr>
+          <a:xfrm>
+            <a:off x="5530761" y="1890296"/>
+            <a:ext cx="5661113" cy="4513238"/>
+          </a:xfrm>
+          <a:prstGeom prst="rect">
+            <a:avLst/>
+          </a:prstGeom>
+        </p:spPr>
+      </p:pic>
     </p:spTree>
     <p:extLst>
       <p:ext uri="{BB962C8B-B14F-4D97-AF65-F5344CB8AC3E}">
@@ -9979,7 +10009,7 @@
             </a:pPr>
             <a:r>
               <a:rPr lang="it-IT" dirty="0"/>
-              <a:t>Tutto il software è raggiungibile al link: https://github.com/Ciro-Fusco/NewDM , il modulo al link: https://github.com/Ciro-Fusco/NewDM/tree/Codice/modulo</a:t>
+              <a:t>Tutto il software è raggiungibile al link: https://github.com/Ciro-Fusco/NewDM , il modulo al link: https://github.com/Ciro-Fusco/NewDM/tree/main/modulo</a:t>
             </a:r>
           </a:p>
         </p:txBody>

</xml_diff>

<commit_message>
Aggiornamenti combinazioni di testing e rifinimenti modulo
</commit_message>
<xml_diff>
--- a/modulo/Modulo di IA.pptx
+++ b/modulo/Modulo di IA.pptx
@@ -362,7 +362,7 @@
             <a:fld id="{B61BEF0D-F0BB-DE4B-95CE-6DB70DBA9567}" type="datetimeFigureOut">
               <a:rPr lang="en-US" dirty="0"/>
               <a:pPr/>
-              <a:t>1/24/2021</a:t>
+              <a:t>1/25/2021</a:t>
             </a:fld>
             <a:endParaRPr lang="en-US" dirty="0"/>
           </a:p>
@@ -693,7 +693,7 @@
             <a:fld id="{B61BEF0D-F0BB-DE4B-95CE-6DB70DBA9567}" type="datetimeFigureOut">
               <a:rPr lang="en-US" dirty="0"/>
               <a:pPr/>
-              <a:t>1/24/2021</a:t>
+              <a:t>1/25/2021</a:t>
             </a:fld>
             <a:endParaRPr lang="en-US" dirty="0"/>
           </a:p>
@@ -968,7 +968,7 @@
             <a:fld id="{B61BEF0D-F0BB-DE4B-95CE-6DB70DBA9567}" type="datetimeFigureOut">
               <a:rPr lang="en-US" dirty="0"/>
               <a:pPr/>
-              <a:t>1/24/2021</a:t>
+              <a:t>1/25/2021</a:t>
             </a:fld>
             <a:endParaRPr lang="en-US" dirty="0"/>
           </a:p>
@@ -1533,7 +1533,7 @@
             <a:fld id="{B61BEF0D-F0BB-DE4B-95CE-6DB70DBA9567}" type="datetimeFigureOut">
               <a:rPr lang="en-US" dirty="0"/>
               <a:pPr/>
-              <a:t>1/24/2021</a:t>
+              <a:t>1/25/2021</a:t>
             </a:fld>
             <a:endParaRPr lang="en-US" dirty="0"/>
           </a:p>
@@ -1808,7 +1808,7 @@
             <a:fld id="{B61BEF0D-F0BB-DE4B-95CE-6DB70DBA9567}" type="datetimeFigureOut">
               <a:rPr lang="en-US" dirty="0"/>
               <a:pPr/>
-              <a:t>1/24/2021</a:t>
+              <a:t>1/25/2021</a:t>
             </a:fld>
             <a:endParaRPr lang="en-US" dirty="0"/>
           </a:p>
@@ -2367,7 +2367,7 @@
             <a:fld id="{B61BEF0D-F0BB-DE4B-95CE-6DB70DBA9567}" type="datetimeFigureOut">
               <a:rPr lang="en-US" dirty="0"/>
               <a:pPr/>
-              <a:t>1/24/2021</a:t>
+              <a:t>1/25/2021</a:t>
             </a:fld>
             <a:endParaRPr lang="en-US" dirty="0"/>
           </a:p>
@@ -2691,7 +2691,7 @@
             <a:fld id="{B61BEF0D-F0BB-DE4B-95CE-6DB70DBA9567}" type="datetimeFigureOut">
               <a:rPr lang="en-US" dirty="0"/>
               <a:pPr/>
-              <a:t>1/24/2021</a:t>
+              <a:t>1/25/2021</a:t>
             </a:fld>
             <a:endParaRPr lang="en-US" dirty="0"/>
           </a:p>
@@ -2865,7 +2865,7 @@
             <a:fld id="{B61BEF0D-F0BB-DE4B-95CE-6DB70DBA9567}" type="datetimeFigureOut">
               <a:rPr lang="en-US" dirty="0"/>
               <a:pPr/>
-              <a:t>1/24/2021</a:t>
+              <a:t>1/25/2021</a:t>
             </a:fld>
             <a:endParaRPr lang="en-US" dirty="0"/>
           </a:p>
@@ -3100,7 +3100,7 @@
             <a:fld id="{B61BEF0D-F0BB-DE4B-95CE-6DB70DBA9567}" type="datetimeFigureOut">
               <a:rPr lang="en-US" dirty="0"/>
               <a:pPr/>
-              <a:t>1/24/2021</a:t>
+              <a:t>1/25/2021</a:t>
             </a:fld>
             <a:endParaRPr lang="en-US" dirty="0"/>
           </a:p>
@@ -3297,7 +3297,7 @@
             <a:fld id="{B61BEF0D-F0BB-DE4B-95CE-6DB70DBA9567}" type="datetimeFigureOut">
               <a:rPr lang="en-US" dirty="0"/>
               <a:pPr/>
-              <a:t>1/24/2021</a:t>
+              <a:t>1/25/2021</a:t>
             </a:fld>
             <a:endParaRPr lang="en-US" dirty="0"/>
           </a:p>
@@ -3570,7 +3570,7 @@
             <a:fld id="{B61BEF0D-F0BB-DE4B-95CE-6DB70DBA9567}" type="datetimeFigureOut">
               <a:rPr lang="en-US" dirty="0"/>
               <a:pPr/>
-              <a:t>1/24/2021</a:t>
+              <a:t>1/25/2021</a:t>
             </a:fld>
             <a:endParaRPr lang="en-US" dirty="0"/>
           </a:p>
@@ -3833,7 +3833,7 @@
             <a:fld id="{B61BEF0D-F0BB-DE4B-95CE-6DB70DBA9567}" type="datetimeFigureOut">
               <a:rPr lang="en-US" dirty="0"/>
               <a:pPr/>
-              <a:t>1/24/2021</a:t>
+              <a:t>1/25/2021</a:t>
             </a:fld>
             <a:endParaRPr lang="en-US" dirty="0"/>
           </a:p>
@@ -4204,7 +4204,7 @@
             <a:fld id="{B61BEF0D-F0BB-DE4B-95CE-6DB70DBA9567}" type="datetimeFigureOut">
               <a:rPr lang="en-US" dirty="0"/>
               <a:pPr/>
-              <a:t>1/24/2021</a:t>
+              <a:t>1/25/2021</a:t>
             </a:fld>
             <a:endParaRPr lang="en-US" dirty="0"/>
           </a:p>
@@ -4349,7 +4349,7 @@
             <a:fld id="{B61BEF0D-F0BB-DE4B-95CE-6DB70DBA9567}" type="datetimeFigureOut">
               <a:rPr lang="en-US" dirty="0"/>
               <a:pPr/>
-              <a:t>1/24/2021</a:t>
+              <a:t>1/25/2021</a:t>
             </a:fld>
             <a:endParaRPr lang="en-US" dirty="0"/>
           </a:p>
@@ -4471,7 +4471,7 @@
             <a:fld id="{B61BEF0D-F0BB-DE4B-95CE-6DB70DBA9567}" type="datetimeFigureOut">
               <a:rPr lang="en-US" dirty="0"/>
               <a:pPr/>
-              <a:t>1/24/2021</a:t>
+              <a:t>1/25/2021</a:t>
             </a:fld>
             <a:endParaRPr lang="en-US" dirty="0"/>
           </a:p>
@@ -4753,7 +4753,7 @@
             <a:fld id="{B61BEF0D-F0BB-DE4B-95CE-6DB70DBA9567}" type="datetimeFigureOut">
               <a:rPr lang="en-US" dirty="0"/>
               <a:pPr/>
-              <a:t>1/24/2021</a:t>
+              <a:t>1/25/2021</a:t>
             </a:fld>
             <a:endParaRPr lang="en-US" dirty="0"/>
           </a:p>
@@ -5074,7 +5074,7 @@
             <a:fld id="{B61BEF0D-F0BB-DE4B-95CE-6DB70DBA9567}" type="datetimeFigureOut">
               <a:rPr lang="en-US" dirty="0"/>
               <a:pPr/>
-              <a:t>1/24/2021</a:t>
+              <a:t>1/25/2021</a:t>
             </a:fld>
             <a:endParaRPr lang="en-US" dirty="0"/>
           </a:p>
@@ -5285,7 +5285,7 @@
             <a:fld id="{B61BEF0D-F0BB-DE4B-95CE-6DB70DBA9567}" type="datetimeFigureOut">
               <a:rPr lang="en-US" dirty="0"/>
               <a:pPr/>
-              <a:t>1/24/2021</a:t>
+              <a:t>1/25/2021</a:t>
             </a:fld>
             <a:endParaRPr lang="en-US" dirty="0"/>
           </a:p>
@@ -5822,10 +5822,21 @@
           </a:bodyPr>
           <a:lstStyle/>
           <a:p>
-            <a:r>
+            <a:br>
               <a:rPr lang="it-IT" sz="5400" dirty="0"/>
+            </a:br>
+            <a:r>
+              <a:rPr lang="it-IT" sz="5400" dirty="0" err="1"/>
+              <a:t>WarehouseAI</a:t>
+            </a:r>
+            <a:br>
+              <a:rPr lang="it-IT" sz="5400" dirty="0"/>
+            </a:br>
+            <a:r>
+              <a:rPr lang="it-IT" sz="2400" dirty="0"/>
               <a:t>Modulo di IA</a:t>
             </a:r>
+            <a:endParaRPr lang="it-IT" sz="5400" dirty="0"/>
           </a:p>
         </p:txBody>
       </p:sp>
@@ -9293,7 +9304,25 @@
                 <a:ea typeface="Calibri" panose="020F0502020204030204" pitchFamily="34" charset="0"/>
                 <a:cs typeface="Times New Roman" panose="02020603050405020304" pitchFamily="18" charset="0"/>
               </a:rPr>
-              <a:t>(La misura di prestazione adottata per valutare l’operato dell’agente): buona previsione delle quantità necessarie al magazzino, riduzione dei costi e maggiori entrate per il magazzino.</a:t>
+              <a:t>(La misura di prestazione adottata per valutare l’operato dell’agente): buona previsione delle quantità </a:t>
+            </a:r>
+            <a:r>
+              <a:rPr lang="it-IT" sz="1800">
+                <a:effectLst/>
+                <a:latin typeface="Calibri" panose="020F0502020204030204" pitchFamily="34" charset="0"/>
+                <a:ea typeface="Calibri" panose="020F0502020204030204" pitchFamily="34" charset="0"/>
+                <a:cs typeface="Times New Roman" panose="02020603050405020304" pitchFamily="18" charset="0"/>
+              </a:rPr>
+              <a:t>di prodotti necessari </a:t>
+            </a:r>
+            <a:r>
+              <a:rPr lang="it-IT" sz="1800" dirty="0">
+                <a:effectLst/>
+                <a:latin typeface="Calibri" panose="020F0502020204030204" pitchFamily="34" charset="0"/>
+                <a:ea typeface="Calibri" panose="020F0502020204030204" pitchFamily="34" charset="0"/>
+                <a:cs typeface="Times New Roman" panose="02020603050405020304" pitchFamily="18" charset="0"/>
+              </a:rPr>
+              <a:t>al magazzino, riduzione dei costi e maggiori entrate per il magazzino.</a:t>
             </a:r>
           </a:p>
           <a:p>

</xml_diff>

<commit_message>
Revert "Merge branch 'main' into Codice"
This reverts commit bb703173abc4fc1ec10fc5988399e3fa87ef8efa, reversing
changes made to 29a4ede5827a60342091529ba90b93090490a0c7.
</commit_message>
<xml_diff>
--- a/modulo/Modulo di IA.pptx
+++ b/modulo/Modulo di IA.pptx
@@ -362,7 +362,7 @@
             <a:fld id="{B61BEF0D-F0BB-DE4B-95CE-6DB70DBA9567}" type="datetimeFigureOut">
               <a:rPr lang="en-US" dirty="0"/>
               <a:pPr/>
-              <a:t>1/25/2021</a:t>
+              <a:t>1/24/2021</a:t>
             </a:fld>
             <a:endParaRPr lang="en-US" dirty="0"/>
           </a:p>
@@ -693,7 +693,7 @@
             <a:fld id="{B61BEF0D-F0BB-DE4B-95CE-6DB70DBA9567}" type="datetimeFigureOut">
               <a:rPr lang="en-US" dirty="0"/>
               <a:pPr/>
-              <a:t>1/25/2021</a:t>
+              <a:t>1/24/2021</a:t>
             </a:fld>
             <a:endParaRPr lang="en-US" dirty="0"/>
           </a:p>
@@ -968,7 +968,7 @@
             <a:fld id="{B61BEF0D-F0BB-DE4B-95CE-6DB70DBA9567}" type="datetimeFigureOut">
               <a:rPr lang="en-US" dirty="0"/>
               <a:pPr/>
-              <a:t>1/25/2021</a:t>
+              <a:t>1/24/2021</a:t>
             </a:fld>
             <a:endParaRPr lang="en-US" dirty="0"/>
           </a:p>
@@ -1533,7 +1533,7 @@
             <a:fld id="{B61BEF0D-F0BB-DE4B-95CE-6DB70DBA9567}" type="datetimeFigureOut">
               <a:rPr lang="en-US" dirty="0"/>
               <a:pPr/>
-              <a:t>1/25/2021</a:t>
+              <a:t>1/24/2021</a:t>
             </a:fld>
             <a:endParaRPr lang="en-US" dirty="0"/>
           </a:p>
@@ -1808,7 +1808,7 @@
             <a:fld id="{B61BEF0D-F0BB-DE4B-95CE-6DB70DBA9567}" type="datetimeFigureOut">
               <a:rPr lang="en-US" dirty="0"/>
               <a:pPr/>
-              <a:t>1/25/2021</a:t>
+              <a:t>1/24/2021</a:t>
             </a:fld>
             <a:endParaRPr lang="en-US" dirty="0"/>
           </a:p>
@@ -2367,7 +2367,7 @@
             <a:fld id="{B61BEF0D-F0BB-DE4B-95CE-6DB70DBA9567}" type="datetimeFigureOut">
               <a:rPr lang="en-US" dirty="0"/>
               <a:pPr/>
-              <a:t>1/25/2021</a:t>
+              <a:t>1/24/2021</a:t>
             </a:fld>
             <a:endParaRPr lang="en-US" dirty="0"/>
           </a:p>
@@ -2691,7 +2691,7 @@
             <a:fld id="{B61BEF0D-F0BB-DE4B-95CE-6DB70DBA9567}" type="datetimeFigureOut">
               <a:rPr lang="en-US" dirty="0"/>
               <a:pPr/>
-              <a:t>1/25/2021</a:t>
+              <a:t>1/24/2021</a:t>
             </a:fld>
             <a:endParaRPr lang="en-US" dirty="0"/>
           </a:p>
@@ -2865,7 +2865,7 @@
             <a:fld id="{B61BEF0D-F0BB-DE4B-95CE-6DB70DBA9567}" type="datetimeFigureOut">
               <a:rPr lang="en-US" dirty="0"/>
               <a:pPr/>
-              <a:t>1/25/2021</a:t>
+              <a:t>1/24/2021</a:t>
             </a:fld>
             <a:endParaRPr lang="en-US" dirty="0"/>
           </a:p>
@@ -3100,7 +3100,7 @@
             <a:fld id="{B61BEF0D-F0BB-DE4B-95CE-6DB70DBA9567}" type="datetimeFigureOut">
               <a:rPr lang="en-US" dirty="0"/>
               <a:pPr/>
-              <a:t>1/25/2021</a:t>
+              <a:t>1/24/2021</a:t>
             </a:fld>
             <a:endParaRPr lang="en-US" dirty="0"/>
           </a:p>
@@ -3297,7 +3297,7 @@
             <a:fld id="{B61BEF0D-F0BB-DE4B-95CE-6DB70DBA9567}" type="datetimeFigureOut">
               <a:rPr lang="en-US" dirty="0"/>
               <a:pPr/>
-              <a:t>1/25/2021</a:t>
+              <a:t>1/24/2021</a:t>
             </a:fld>
             <a:endParaRPr lang="en-US" dirty="0"/>
           </a:p>
@@ -3570,7 +3570,7 @@
             <a:fld id="{B61BEF0D-F0BB-DE4B-95CE-6DB70DBA9567}" type="datetimeFigureOut">
               <a:rPr lang="en-US" dirty="0"/>
               <a:pPr/>
-              <a:t>1/25/2021</a:t>
+              <a:t>1/24/2021</a:t>
             </a:fld>
             <a:endParaRPr lang="en-US" dirty="0"/>
           </a:p>
@@ -3833,7 +3833,7 @@
             <a:fld id="{B61BEF0D-F0BB-DE4B-95CE-6DB70DBA9567}" type="datetimeFigureOut">
               <a:rPr lang="en-US" dirty="0"/>
               <a:pPr/>
-              <a:t>1/25/2021</a:t>
+              <a:t>1/24/2021</a:t>
             </a:fld>
             <a:endParaRPr lang="en-US" dirty="0"/>
           </a:p>
@@ -4204,7 +4204,7 @@
             <a:fld id="{B61BEF0D-F0BB-DE4B-95CE-6DB70DBA9567}" type="datetimeFigureOut">
               <a:rPr lang="en-US" dirty="0"/>
               <a:pPr/>
-              <a:t>1/25/2021</a:t>
+              <a:t>1/24/2021</a:t>
             </a:fld>
             <a:endParaRPr lang="en-US" dirty="0"/>
           </a:p>
@@ -4349,7 +4349,7 @@
             <a:fld id="{B61BEF0D-F0BB-DE4B-95CE-6DB70DBA9567}" type="datetimeFigureOut">
               <a:rPr lang="en-US" dirty="0"/>
               <a:pPr/>
-              <a:t>1/25/2021</a:t>
+              <a:t>1/24/2021</a:t>
             </a:fld>
             <a:endParaRPr lang="en-US" dirty="0"/>
           </a:p>
@@ -4471,7 +4471,7 @@
             <a:fld id="{B61BEF0D-F0BB-DE4B-95CE-6DB70DBA9567}" type="datetimeFigureOut">
               <a:rPr lang="en-US" dirty="0"/>
               <a:pPr/>
-              <a:t>1/25/2021</a:t>
+              <a:t>1/24/2021</a:t>
             </a:fld>
             <a:endParaRPr lang="en-US" dirty="0"/>
           </a:p>
@@ -4753,7 +4753,7 @@
             <a:fld id="{B61BEF0D-F0BB-DE4B-95CE-6DB70DBA9567}" type="datetimeFigureOut">
               <a:rPr lang="en-US" dirty="0"/>
               <a:pPr/>
-              <a:t>1/25/2021</a:t>
+              <a:t>1/24/2021</a:t>
             </a:fld>
             <a:endParaRPr lang="en-US" dirty="0"/>
           </a:p>
@@ -5074,7 +5074,7 @@
             <a:fld id="{B61BEF0D-F0BB-DE4B-95CE-6DB70DBA9567}" type="datetimeFigureOut">
               <a:rPr lang="en-US" dirty="0"/>
               <a:pPr/>
-              <a:t>1/25/2021</a:t>
+              <a:t>1/24/2021</a:t>
             </a:fld>
             <a:endParaRPr lang="en-US" dirty="0"/>
           </a:p>
@@ -5285,7 +5285,7 @@
             <a:fld id="{B61BEF0D-F0BB-DE4B-95CE-6DB70DBA9567}" type="datetimeFigureOut">
               <a:rPr lang="en-US" dirty="0"/>
               <a:pPr/>
-              <a:t>1/25/2021</a:t>
+              <a:t>1/24/2021</a:t>
             </a:fld>
             <a:endParaRPr lang="en-US" dirty="0"/>
           </a:p>
@@ -5822,21 +5822,10 @@
           </a:bodyPr>
           <a:lstStyle/>
           <a:p>
-            <a:br>
+            <a:r>
               <a:rPr lang="it-IT" sz="5400" dirty="0"/>
-            </a:br>
-            <a:r>
-              <a:rPr lang="it-IT" sz="5400" dirty="0" err="1"/>
-              <a:t>WarehouseAI</a:t>
-            </a:r>
-            <a:br>
-              <a:rPr lang="it-IT" sz="5400" dirty="0"/>
-            </a:br>
-            <a:r>
-              <a:rPr lang="it-IT" sz="2400" dirty="0"/>
               <a:t>Modulo di IA</a:t>
             </a:r>
-            <a:endParaRPr lang="it-IT" sz="5400" dirty="0"/>
           </a:p>
         </p:txBody>
       </p:sp>
@@ -8632,36 +8621,6 @@
           </a:p>
         </p:txBody>
       </p:sp>
-      <p:pic>
-        <p:nvPicPr>
-          <p:cNvPr id="5" name="Immagine 4" descr="Immagine che contiene testo, screenshot, elettronico&#10;&#10;Descrizione generata automaticamente">
-            <a:extLst>
-              <a:ext uri="{FF2B5EF4-FFF2-40B4-BE49-F238E27FC236}">
-                <a16:creationId xmlns:a16="http://schemas.microsoft.com/office/drawing/2014/main" id="{2B570445-4872-4612-8936-4F1D81987718}"/>
-              </a:ext>
-            </a:extLst>
-          </p:cNvPr>
-          <p:cNvPicPr>
-            <a:picLocks noChangeAspect="1"/>
-          </p:cNvPicPr>
-          <p:nvPr/>
-        </p:nvPicPr>
-        <p:blipFill>
-          <a:blip r:embed="rId2"/>
-          <a:stretch>
-            <a:fillRect/>
-          </a:stretch>
-        </p:blipFill>
-        <p:spPr>
-          <a:xfrm>
-            <a:off x="5530761" y="1890296"/>
-            <a:ext cx="5661113" cy="4513238"/>
-          </a:xfrm>
-          <a:prstGeom prst="rect">
-            <a:avLst/>
-          </a:prstGeom>
-        </p:spPr>
-      </p:pic>
     </p:spTree>
     <p:extLst>
       <p:ext uri="{BB962C8B-B14F-4D97-AF65-F5344CB8AC3E}">
@@ -9304,25 +9263,7 @@
                 <a:ea typeface="Calibri" panose="020F0502020204030204" pitchFamily="34" charset="0"/>
                 <a:cs typeface="Times New Roman" panose="02020603050405020304" pitchFamily="18" charset="0"/>
               </a:rPr>
-              <a:t>(La misura di prestazione adottata per valutare l’operato dell’agente): buona previsione delle quantità </a:t>
-            </a:r>
-            <a:r>
-              <a:rPr lang="it-IT" sz="1800">
-                <a:effectLst/>
-                <a:latin typeface="Calibri" panose="020F0502020204030204" pitchFamily="34" charset="0"/>
-                <a:ea typeface="Calibri" panose="020F0502020204030204" pitchFamily="34" charset="0"/>
-                <a:cs typeface="Times New Roman" panose="02020603050405020304" pitchFamily="18" charset="0"/>
-              </a:rPr>
-              <a:t>di prodotti necessari </a:t>
-            </a:r>
-            <a:r>
-              <a:rPr lang="it-IT" sz="1800" dirty="0">
-                <a:effectLst/>
-                <a:latin typeface="Calibri" panose="020F0502020204030204" pitchFamily="34" charset="0"/>
-                <a:ea typeface="Calibri" panose="020F0502020204030204" pitchFamily="34" charset="0"/>
-                <a:cs typeface="Times New Roman" panose="02020603050405020304" pitchFamily="18" charset="0"/>
-              </a:rPr>
-              <a:t>al magazzino, riduzione dei costi e maggiori entrate per il magazzino.</a:t>
+              <a:t>(La misura di prestazione adottata per valutare l’operato dell’agente): buona previsione delle quantità necessarie al magazzino, riduzione dei costi e maggiori entrate per il magazzino.</a:t>
             </a:r>
           </a:p>
           <a:p>
@@ -10038,7 +9979,7 @@
             </a:pPr>
             <a:r>
               <a:rPr lang="it-IT" dirty="0"/>
-              <a:t>Tutto il software è raggiungibile al link: https://github.com/Ciro-Fusco/NewDM , il modulo al link: https://github.com/Ciro-Fusco/NewDM/tree/main/modulo</a:t>
+              <a:t>Tutto il software è raggiungibile al link: https://github.com/Ciro-Fusco/NewDM , il modulo al link: https://github.com/Ciro-Fusco/NewDM/tree/Codice/modulo</a:t>
             </a:r>
           </a:p>
         </p:txBody>

</xml_diff>